<commit_message>
Lots of presentation updates
New title
Took out shallow water/geostrophic equations
Added in stability of qg zonal flow
</commit_message>
<xml_diff>
--- a/USRA Presentation/img/drawings.pptx
+++ b/USRA Presentation/img/drawings.pptx
@@ -306,7 +306,7 @@
           <a:p>
             <a:fld id="{E6A4D7A4-9F02-FC41-A991-9C0B4B83BE98}" type="datetimeFigureOut">
               <a:rPr lang="en-US" smtClean="0"/>
-              <a:t>8/7/2015</a:t>
+              <a:t>8/12/2015</a:t>
             </a:fld>
             <a:endParaRPr lang="en-US"/>
           </a:p>
@@ -476,7 +476,7 @@
           <a:p>
             <a:fld id="{E6A4D7A4-9F02-FC41-A991-9C0B4B83BE98}" type="datetimeFigureOut">
               <a:rPr lang="en-US" smtClean="0"/>
-              <a:t>8/7/2015</a:t>
+              <a:t>8/12/2015</a:t>
             </a:fld>
             <a:endParaRPr lang="en-US"/>
           </a:p>
@@ -656,7 +656,7 @@
           <a:p>
             <a:fld id="{E6A4D7A4-9F02-FC41-A991-9C0B4B83BE98}" type="datetimeFigureOut">
               <a:rPr lang="en-US" smtClean="0"/>
-              <a:t>8/7/2015</a:t>
+              <a:t>8/12/2015</a:t>
             </a:fld>
             <a:endParaRPr lang="en-US"/>
           </a:p>
@@ -826,7 +826,7 @@
           <a:p>
             <a:fld id="{E6A4D7A4-9F02-FC41-A991-9C0B4B83BE98}" type="datetimeFigureOut">
               <a:rPr lang="en-US" smtClean="0"/>
-              <a:t>8/7/2015</a:t>
+              <a:t>8/12/2015</a:t>
             </a:fld>
             <a:endParaRPr lang="en-US"/>
           </a:p>
@@ -1072,7 +1072,7 @@
           <a:p>
             <a:fld id="{E6A4D7A4-9F02-FC41-A991-9C0B4B83BE98}" type="datetimeFigureOut">
               <a:rPr lang="en-US" smtClean="0"/>
-              <a:t>8/7/2015</a:t>
+              <a:t>8/12/2015</a:t>
             </a:fld>
             <a:endParaRPr lang="en-US"/>
           </a:p>
@@ -1360,7 +1360,7 @@
           <a:p>
             <a:fld id="{E6A4D7A4-9F02-FC41-A991-9C0B4B83BE98}" type="datetimeFigureOut">
               <a:rPr lang="en-US" smtClean="0"/>
-              <a:t>8/7/2015</a:t>
+              <a:t>8/12/2015</a:t>
             </a:fld>
             <a:endParaRPr lang="en-US"/>
           </a:p>
@@ -1782,7 +1782,7 @@
           <a:p>
             <a:fld id="{E6A4D7A4-9F02-FC41-A991-9C0B4B83BE98}" type="datetimeFigureOut">
               <a:rPr lang="en-US" smtClean="0"/>
-              <a:t>8/7/2015</a:t>
+              <a:t>8/12/2015</a:t>
             </a:fld>
             <a:endParaRPr lang="en-US"/>
           </a:p>
@@ -1900,7 +1900,7 @@
           <a:p>
             <a:fld id="{E6A4D7A4-9F02-FC41-A991-9C0B4B83BE98}" type="datetimeFigureOut">
               <a:rPr lang="en-US" smtClean="0"/>
-              <a:t>8/7/2015</a:t>
+              <a:t>8/12/2015</a:t>
             </a:fld>
             <a:endParaRPr lang="en-US"/>
           </a:p>
@@ -1995,7 +1995,7 @@
           <a:p>
             <a:fld id="{E6A4D7A4-9F02-FC41-A991-9C0B4B83BE98}" type="datetimeFigureOut">
               <a:rPr lang="en-US" smtClean="0"/>
-              <a:t>8/7/2015</a:t>
+              <a:t>8/12/2015</a:t>
             </a:fld>
             <a:endParaRPr lang="en-US"/>
           </a:p>
@@ -2272,7 +2272,7 @@
           <a:p>
             <a:fld id="{E6A4D7A4-9F02-FC41-A991-9C0B4B83BE98}" type="datetimeFigureOut">
               <a:rPr lang="en-US" smtClean="0"/>
-              <a:t>8/7/2015</a:t>
+              <a:t>8/12/2015</a:t>
             </a:fld>
             <a:endParaRPr lang="en-US"/>
           </a:p>
@@ -2525,7 +2525,7 @@
           <a:p>
             <a:fld id="{E6A4D7A4-9F02-FC41-A991-9C0B4B83BE98}" type="datetimeFigureOut">
               <a:rPr lang="en-US" smtClean="0"/>
-              <a:t>8/7/2015</a:t>
+              <a:t>8/12/2015</a:t>
             </a:fld>
             <a:endParaRPr lang="en-US"/>
           </a:p>
@@ -2738,7 +2738,7 @@
           <a:p>
             <a:fld id="{E6A4D7A4-9F02-FC41-A991-9C0B4B83BE98}" type="datetimeFigureOut">
               <a:rPr lang="en-US" smtClean="0"/>
-              <a:t>8/7/2015</a:t>
+              <a:t>8/12/2015</a:t>
             </a:fld>
             <a:endParaRPr lang="en-US"/>
           </a:p>
@@ -3709,6 +3709,100 @@
           <a:chExt cx="0" cy="0"/>
         </a:xfrm>
       </p:grpSpPr>
+      <p:sp>
+        <p:nvSpPr>
+          <p:cNvPr id="18" name="Rectangle 17"/>
+          <p:cNvSpPr/>
+          <p:nvPr/>
+        </p:nvSpPr>
+        <p:spPr>
+          <a:xfrm>
+            <a:off x="2001328" y="776377"/>
+            <a:ext cx="4294778" cy="628647"/>
+          </a:xfrm>
+          <a:prstGeom prst="rect">
+            <a:avLst/>
+          </a:prstGeom>
+          <a:solidFill>
+            <a:schemeClr val="accent6">
+              <a:lumMod val="20000"/>
+              <a:lumOff val="80000"/>
+            </a:schemeClr>
+          </a:solidFill>
+          <a:ln>
+            <a:noFill/>
+          </a:ln>
+        </p:spPr>
+        <p:style>
+          <a:lnRef idx="1">
+            <a:schemeClr val="accent1"/>
+          </a:lnRef>
+          <a:fillRef idx="3">
+            <a:schemeClr val="accent1"/>
+          </a:fillRef>
+          <a:effectRef idx="2">
+            <a:schemeClr val="accent1"/>
+          </a:effectRef>
+          <a:fontRef idx="minor">
+            <a:schemeClr val="lt1"/>
+          </a:fontRef>
+        </p:style>
+        <p:txBody>
+          <a:bodyPr rtlCol="0" anchor="ctr"/>
+          <a:lstStyle/>
+          <a:p>
+            <a:pPr algn="ctr"/>
+            <a:endParaRPr lang="en-CA" dirty="0"/>
+          </a:p>
+        </p:txBody>
+      </p:sp>
+      <p:sp>
+        <p:nvSpPr>
+          <p:cNvPr id="4" name="Rectangle 3"/>
+          <p:cNvSpPr/>
+          <p:nvPr/>
+        </p:nvSpPr>
+        <p:spPr>
+          <a:xfrm>
+            <a:off x="2011131" y="1417607"/>
+            <a:ext cx="4294778" cy="595930"/>
+          </a:xfrm>
+          <a:prstGeom prst="rect">
+            <a:avLst/>
+          </a:prstGeom>
+          <a:solidFill>
+            <a:schemeClr val="accent1">
+              <a:lumMod val="40000"/>
+              <a:lumOff val="60000"/>
+            </a:schemeClr>
+          </a:solidFill>
+          <a:ln>
+            <a:noFill/>
+          </a:ln>
+        </p:spPr>
+        <p:style>
+          <a:lnRef idx="1">
+            <a:schemeClr val="accent1"/>
+          </a:lnRef>
+          <a:fillRef idx="3">
+            <a:schemeClr val="accent1"/>
+          </a:fillRef>
+          <a:effectRef idx="2">
+            <a:schemeClr val="accent1"/>
+          </a:effectRef>
+          <a:fontRef idx="minor">
+            <a:schemeClr val="lt1"/>
+          </a:fontRef>
+        </p:style>
+        <p:txBody>
+          <a:bodyPr rtlCol="0" anchor="ctr"/>
+          <a:lstStyle/>
+          <a:p>
+            <a:pPr algn="ctr"/>
+            <a:endParaRPr lang="en-CA"/>
+          </a:p>
+        </p:txBody>
+      </p:sp>
       <p:cxnSp>
         <p:nvCxnSpPr>
           <p:cNvPr id="17" name="Straight Connector 16"/>
@@ -4187,6 +4281,307 @@
           </a:p>
         </p:txBody>
       </p:sp>
+      <p:cxnSp>
+        <p:nvCxnSpPr>
+          <p:cNvPr id="3" name="Straight Connector 2"/>
+          <p:cNvCxnSpPr/>
+          <p:nvPr/>
+        </p:nvCxnSpPr>
+        <p:spPr>
+          <a:xfrm>
+            <a:off x="2001328" y="776377"/>
+            <a:ext cx="4304581" cy="0"/>
+          </a:xfrm>
+          <a:prstGeom prst="line">
+            <a:avLst/>
+          </a:prstGeom>
+          <a:effectLst/>
+        </p:spPr>
+        <p:style>
+          <a:lnRef idx="2">
+            <a:schemeClr val="accent6"/>
+          </a:lnRef>
+          <a:fillRef idx="0">
+            <a:schemeClr val="accent6"/>
+          </a:fillRef>
+          <a:effectRef idx="1">
+            <a:schemeClr val="accent6"/>
+          </a:effectRef>
+          <a:fontRef idx="minor">
+            <a:schemeClr val="tx1"/>
+          </a:fontRef>
+        </p:style>
+      </p:cxnSp>
+      <p:cxnSp>
+        <p:nvCxnSpPr>
+          <p:cNvPr id="13" name="Straight Connector 12"/>
+          <p:cNvCxnSpPr/>
+          <p:nvPr/>
+        </p:nvCxnSpPr>
+        <p:spPr>
+          <a:xfrm>
+            <a:off x="2011131" y="2007079"/>
+            <a:ext cx="4304581" cy="0"/>
+          </a:xfrm>
+          <a:prstGeom prst="line">
+            <a:avLst/>
+          </a:prstGeom>
+          <a:effectLst/>
+        </p:spPr>
+        <p:style>
+          <a:lnRef idx="2">
+            <a:schemeClr val="accent1"/>
+          </a:lnRef>
+          <a:fillRef idx="0">
+            <a:schemeClr val="accent1"/>
+          </a:fillRef>
+          <a:effectRef idx="1">
+            <a:schemeClr val="accent1"/>
+          </a:effectRef>
+          <a:fontRef idx="minor">
+            <a:schemeClr val="tx1"/>
+          </a:fontRef>
+        </p:style>
+      </p:cxnSp>
+      <p:cxnSp>
+        <p:nvCxnSpPr>
+          <p:cNvPr id="16" name="Straight Connector 15"/>
+          <p:cNvCxnSpPr/>
+          <p:nvPr/>
+        </p:nvCxnSpPr>
+        <p:spPr>
+          <a:xfrm>
+            <a:off x="2011131" y="1417607"/>
+            <a:ext cx="4304581" cy="0"/>
+          </a:xfrm>
+          <a:prstGeom prst="line">
+            <a:avLst/>
+          </a:prstGeom>
+          <a:ln>
+            <a:solidFill>
+              <a:schemeClr val="tx1"/>
+            </a:solidFill>
+            <a:prstDash val="sysDash"/>
+          </a:ln>
+          <a:effectLst/>
+        </p:spPr>
+        <p:style>
+          <a:lnRef idx="2">
+            <a:schemeClr val="accent1"/>
+          </a:lnRef>
+          <a:fillRef idx="0">
+            <a:schemeClr val="accent1"/>
+          </a:fillRef>
+          <a:effectRef idx="1">
+            <a:schemeClr val="accent1"/>
+          </a:effectRef>
+          <a:fontRef idx="minor">
+            <a:schemeClr val="tx1"/>
+          </a:fontRef>
+        </p:style>
+      </p:cxnSp>
+      <mc:AlternateContent xmlns:mc="http://schemas.openxmlformats.org/markup-compatibility/2006">
+        <mc:Choice xmlns:a14="http://schemas.microsoft.com/office/drawing/2010/main" Requires="a14">
+          <p:sp>
+            <p:nvSpPr>
+              <p:cNvPr id="5" name="TextBox 4"/>
+              <p:cNvSpPr txBox="1"/>
+              <p:nvPr/>
+            </p:nvSpPr>
+            <p:spPr>
+              <a:xfrm>
+                <a:off x="4008767" y="952201"/>
+                <a:ext cx="454996" cy="276999"/>
+              </a:xfrm>
+              <a:prstGeom prst="rect">
+                <a:avLst/>
+              </a:prstGeom>
+              <a:noFill/>
+            </p:spPr>
+            <p:txBody>
+              <a:bodyPr wrap="none" lIns="0" tIns="0" rIns="0" bIns="0" rtlCol="0">
+                <a:spAutoFit/>
+              </a:bodyPr>
+              <a:lstStyle/>
+              <a:p>
+                <a14:m>
+                  <m:oMath xmlns:m="http://schemas.openxmlformats.org/officeDocument/2006/math">
+                    <m:sSub>
+                      <m:sSubPr>
+                        <m:ctrlPr>
+                          <a:rPr lang="en-CA" b="0" i="1" smtClean="0">
+                            <a:latin typeface="Cambria Math" panose="02040503050406030204" pitchFamily="18" charset="0"/>
+                          </a:rPr>
+                        </m:ctrlPr>
+                      </m:sSubPr>
+                      <m:e>
+                        <m:r>
+                          <a:rPr lang="en-CA" b="0" i="1" smtClean="0">
+                            <a:latin typeface="Cambria Math" panose="02040503050406030204" pitchFamily="18" charset="0"/>
+                          </a:rPr>
+                          <m:t>𝑈</m:t>
+                        </m:r>
+                      </m:e>
+                      <m:sub>
+                        <m:r>
+                          <a:rPr lang="en-CA" b="0" i="1" smtClean="0">
+                            <a:latin typeface="Cambria Math" panose="02040503050406030204" pitchFamily="18" charset="0"/>
+                          </a:rPr>
+                          <m:t>1</m:t>
+                        </m:r>
+                      </m:sub>
+                    </m:sSub>
+                  </m:oMath>
+                </a14:m>
+                <a:r>
+                  <a:rPr lang="en-CA" dirty="0" smtClean="0"/>
+                  <a:t>→</a:t>
+                </a:r>
+                <a:endParaRPr lang="en-CA" dirty="0"/>
+              </a:p>
+            </p:txBody>
+          </p:sp>
+        </mc:Choice>
+        <mc:Fallback>
+          <p:sp>
+            <p:nvSpPr>
+              <p:cNvPr id="5" name="TextBox 4"/>
+              <p:cNvSpPr txBox="1">
+                <a:spLocks noRot="1" noChangeAspect="1" noMove="1" noResize="1" noEditPoints="1" noAdjustHandles="1" noChangeArrowheads="1" noChangeShapeType="1" noTextEdit="1"/>
+              </p:cNvSpPr>
+              <p:nvPr/>
+            </p:nvSpPr>
+            <p:spPr>
+              <a:xfrm>
+                <a:off x="4008767" y="952201"/>
+                <a:ext cx="454996" cy="276999"/>
+              </a:xfrm>
+              <a:prstGeom prst="rect">
+                <a:avLst/>
+              </a:prstGeom>
+              <a:blipFill rotWithShape="0">
+                <a:blip r:embed="rId2"/>
+                <a:stretch>
+                  <a:fillRect l="-18919" t="-28261" r="-31081" b="-50000"/>
+                </a:stretch>
+              </a:blipFill>
+            </p:spPr>
+            <p:txBody>
+              <a:bodyPr/>
+              <a:lstStyle/>
+              <a:p>
+                <a:r>
+                  <a:rPr lang="en-CA">
+                    <a:noFill/>
+                  </a:rPr>
+                  <a:t> </a:t>
+                </a:r>
+              </a:p>
+            </p:txBody>
+          </p:sp>
+        </mc:Fallback>
+      </mc:AlternateContent>
+      <mc:AlternateContent xmlns:mc="http://schemas.openxmlformats.org/markup-compatibility/2006">
+        <mc:Choice xmlns:a14="http://schemas.microsoft.com/office/drawing/2010/main" Requires="a14">
+          <p:sp>
+            <p:nvSpPr>
+              <p:cNvPr id="19" name="TextBox 18"/>
+              <p:cNvSpPr txBox="1"/>
+              <p:nvPr/>
+            </p:nvSpPr>
+            <p:spPr>
+              <a:xfrm>
+                <a:off x="3998964" y="1579412"/>
+                <a:ext cx="513217" cy="276999"/>
+              </a:xfrm>
+              <a:prstGeom prst="rect">
+                <a:avLst/>
+              </a:prstGeom>
+              <a:noFill/>
+            </p:spPr>
+            <p:txBody>
+              <a:bodyPr wrap="none" lIns="0" tIns="0" rIns="0" bIns="0" rtlCol="0">
+                <a:spAutoFit/>
+              </a:bodyPr>
+              <a:lstStyle/>
+              <a:p>
+                <a14:m>
+                  <m:oMath xmlns:m="http://schemas.openxmlformats.org/officeDocument/2006/math">
+                    <m:sSub>
+                      <m:sSubPr>
+                        <m:ctrlPr>
+                          <a:rPr lang="en-CA" b="0" i="1" smtClean="0">
+                            <a:latin typeface="Cambria Math" panose="02040503050406030204" pitchFamily="18" charset="0"/>
+                          </a:rPr>
+                        </m:ctrlPr>
+                      </m:sSubPr>
+                      <m:e>
+                        <m:r>
+                          <a:rPr lang="en-CA" b="0" i="1" smtClean="0">
+                            <a:latin typeface="Cambria Math" panose="02040503050406030204" pitchFamily="18" charset="0"/>
+                          </a:rPr>
+                          <m:t>𝑈</m:t>
+                        </m:r>
+                      </m:e>
+                      <m:sub>
+                        <m:r>
+                          <a:rPr lang="en-CA" b="0" i="1" smtClean="0">
+                            <a:latin typeface="Cambria Math" panose="02040503050406030204" pitchFamily="18" charset="0"/>
+                          </a:rPr>
+                          <m:t>2</m:t>
+                        </m:r>
+                      </m:sub>
+                    </m:sSub>
+                  </m:oMath>
+                </a14:m>
+                <a:r>
+                  <a:rPr lang="en-CA" dirty="0"/>
+                  <a:t> →</a:t>
+                </a:r>
+                <a:endParaRPr lang="en-CA" dirty="0"/>
+              </a:p>
+            </p:txBody>
+          </p:sp>
+        </mc:Choice>
+        <mc:Fallback>
+          <p:sp>
+            <p:nvSpPr>
+              <p:cNvPr id="19" name="TextBox 18"/>
+              <p:cNvSpPr txBox="1">
+                <a:spLocks noRot="1" noChangeAspect="1" noMove="1" noResize="1" noEditPoints="1" noAdjustHandles="1" noChangeArrowheads="1" noChangeShapeType="1" noTextEdit="1"/>
+              </p:cNvSpPr>
+              <p:nvPr/>
+            </p:nvSpPr>
+            <p:spPr>
+              <a:xfrm>
+                <a:off x="3998964" y="1579412"/>
+                <a:ext cx="513217" cy="276999"/>
+              </a:xfrm>
+              <a:prstGeom prst="rect">
+                <a:avLst/>
+              </a:prstGeom>
+              <a:blipFill rotWithShape="0">
+                <a:blip r:embed="rId3"/>
+                <a:stretch>
+                  <a:fillRect l="-16667" t="-28261" r="-27381" b="-50000"/>
+                </a:stretch>
+              </a:blipFill>
+            </p:spPr>
+            <p:txBody>
+              <a:bodyPr/>
+              <a:lstStyle/>
+              <a:p>
+                <a:r>
+                  <a:rPr lang="en-CA">
+                    <a:noFill/>
+                  </a:rPr>
+                  <a:t> </a:t>
+                </a:r>
+              </a:p>
+            </p:txBody>
+          </p:sp>
+        </mc:Fallback>
+      </mc:AlternateContent>
     </p:spTree>
     <p:extLst>
       <p:ext uri="{BB962C8B-B14F-4D97-AF65-F5344CB8AC3E}">

</xml_diff>